<commit_message>
Replace previous hospital layout files
Delete HTML submission. Recreate with .JSP webpages
</commit_message>
<xml_diff>
--- a/Hospital Management Design.pptx
+++ b/Hospital Management Design.pptx
@@ -15,9 +15,10 @@
     <p:sldId id="260" r:id="rId9"/>
     <p:sldId id="266" r:id="rId10"/>
     <p:sldId id="267" r:id="rId11"/>
-    <p:sldId id="269" r:id="rId12"/>
-    <p:sldId id="271" r:id="rId13"/>
-    <p:sldId id="272" r:id="rId14"/>
+    <p:sldId id="273" r:id="rId12"/>
+    <p:sldId id="269" r:id="rId13"/>
+    <p:sldId id="271" r:id="rId14"/>
+    <p:sldId id="272" r:id="rId15"/>
   </p:sldIdLst>
   <p:sldSz cx="12192000" cy="6858000"/>
   <p:notesSz cx="6858000" cy="9144000"/>
@@ -116,6 +117,11 @@
       </a:defRPr>
     </a:lvl9pPr>
   </p:defaultTextStyle>
+  <p:extLst>
+    <p:ext uri="{EFAFB233-063F-42B5-8137-9DF3F51BA10A}">
+      <p15:sldGuideLst xmlns:p15="http://schemas.microsoft.com/office/powerpoint/2012/main"/>
+    </p:ext>
+  </p:extLst>
 </p:presentation>
 </file>
 
@@ -268,7 +274,7 @@
           <a:p>
             <a:fld id="{2A24D100-F615-184E-A0AE-323F58089210}" type="datetimeFigureOut">
               <a:rPr lang="en-US" smtClean="0"/>
-              <a:t>7/2/21</a:t>
+              <a:t>7/5/21</a:t>
             </a:fld>
             <a:endParaRPr lang="en-US"/>
           </a:p>
@@ -468,7 +474,7 @@
           <a:p>
             <a:fld id="{2A24D100-F615-184E-A0AE-323F58089210}" type="datetimeFigureOut">
               <a:rPr lang="en-US" smtClean="0"/>
-              <a:t>7/2/21</a:t>
+              <a:t>7/5/21</a:t>
             </a:fld>
             <a:endParaRPr lang="en-US"/>
           </a:p>
@@ -678,7 +684,7 @@
           <a:p>
             <a:fld id="{2A24D100-F615-184E-A0AE-323F58089210}" type="datetimeFigureOut">
               <a:rPr lang="en-US" smtClean="0"/>
-              <a:t>7/2/21</a:t>
+              <a:t>7/5/21</a:t>
             </a:fld>
             <a:endParaRPr lang="en-US"/>
           </a:p>
@@ -878,7 +884,7 @@
           <a:p>
             <a:fld id="{2A24D100-F615-184E-A0AE-323F58089210}" type="datetimeFigureOut">
               <a:rPr lang="en-US" smtClean="0"/>
-              <a:t>7/2/21</a:t>
+              <a:t>7/5/21</a:t>
             </a:fld>
             <a:endParaRPr lang="en-US"/>
           </a:p>
@@ -1154,7 +1160,7 @@
           <a:p>
             <a:fld id="{2A24D100-F615-184E-A0AE-323F58089210}" type="datetimeFigureOut">
               <a:rPr lang="en-US" smtClean="0"/>
-              <a:t>7/2/21</a:t>
+              <a:t>7/5/21</a:t>
             </a:fld>
             <a:endParaRPr lang="en-US"/>
           </a:p>
@@ -1422,7 +1428,7 @@
           <a:p>
             <a:fld id="{2A24D100-F615-184E-A0AE-323F58089210}" type="datetimeFigureOut">
               <a:rPr lang="en-US" smtClean="0"/>
-              <a:t>7/2/21</a:t>
+              <a:t>7/5/21</a:t>
             </a:fld>
             <a:endParaRPr lang="en-US"/>
           </a:p>
@@ -1837,7 +1843,7 @@
           <a:p>
             <a:fld id="{2A24D100-F615-184E-A0AE-323F58089210}" type="datetimeFigureOut">
               <a:rPr lang="en-US" smtClean="0"/>
-              <a:t>7/2/21</a:t>
+              <a:t>7/5/21</a:t>
             </a:fld>
             <a:endParaRPr lang="en-US"/>
           </a:p>
@@ -1979,7 +1985,7 @@
           <a:p>
             <a:fld id="{2A24D100-F615-184E-A0AE-323F58089210}" type="datetimeFigureOut">
               <a:rPr lang="en-US" smtClean="0"/>
-              <a:t>7/2/21</a:t>
+              <a:t>7/5/21</a:t>
             </a:fld>
             <a:endParaRPr lang="en-US"/>
           </a:p>
@@ -2092,7 +2098,7 @@
           <a:p>
             <a:fld id="{2A24D100-F615-184E-A0AE-323F58089210}" type="datetimeFigureOut">
               <a:rPr lang="en-US" smtClean="0"/>
-              <a:t>7/2/21</a:t>
+              <a:t>7/5/21</a:t>
             </a:fld>
             <a:endParaRPr lang="en-US"/>
           </a:p>
@@ -2405,7 +2411,7 @@
           <a:p>
             <a:fld id="{2A24D100-F615-184E-A0AE-323F58089210}" type="datetimeFigureOut">
               <a:rPr lang="en-US" smtClean="0"/>
-              <a:t>7/2/21</a:t>
+              <a:t>7/5/21</a:t>
             </a:fld>
             <a:endParaRPr lang="en-US"/>
           </a:p>
@@ -2694,7 +2700,7 @@
           <a:p>
             <a:fld id="{2A24D100-F615-184E-A0AE-323F58089210}" type="datetimeFigureOut">
               <a:rPr lang="en-US" smtClean="0"/>
-              <a:t>7/2/21</a:t>
+              <a:t>7/5/21</a:t>
             </a:fld>
             <a:endParaRPr lang="en-US"/>
           </a:p>
@@ -2937,7 +2943,7 @@
           <a:p>
             <a:fld id="{2A24D100-F615-184E-A0AE-323F58089210}" type="datetimeFigureOut">
               <a:rPr lang="en-US" smtClean="0"/>
-              <a:t>7/2/21</a:t>
+              <a:t>7/5/21</a:t>
             </a:fld>
             <a:endParaRPr lang="en-US"/>
           </a:p>
@@ -4420,840 +4426,227 @@
       </p:grpSpPr>
       <p:sp>
         <p:nvSpPr>
-          <p:cNvPr id="11" name="Rectangle 10">
-            <a:extLst>
-              <a:ext uri="{FF2B5EF4-FFF2-40B4-BE49-F238E27FC236}">
-                <a16:creationId xmlns:a16="http://schemas.microsoft.com/office/drawing/2014/main" id="{7834B01E-90EF-8942-9E82-155BF03FC169}"/>
-              </a:ext>
-            </a:extLst>
-          </p:cNvPr>
-          <p:cNvSpPr/>
-          <p:nvPr/>
-        </p:nvSpPr>
-        <p:spPr>
-          <a:xfrm>
-            <a:off x="2634144" y="1754144"/>
-            <a:ext cx="7122252" cy="3329584"/>
-          </a:xfrm>
-          <a:prstGeom prst="rect">
-            <a:avLst/>
-          </a:prstGeom>
-          <a:noFill/>
-          <a:ln w="19050"/>
-        </p:spPr>
-        <p:style>
-          <a:lnRef idx="2">
-            <a:schemeClr val="accent1">
-              <a:shade val="50000"/>
-            </a:schemeClr>
-          </a:lnRef>
-          <a:fillRef idx="1">
-            <a:schemeClr val="accent1"/>
-          </a:fillRef>
-          <a:effectRef idx="0">
-            <a:schemeClr val="accent1"/>
-          </a:effectRef>
-          <a:fontRef idx="minor">
-            <a:schemeClr val="lt1"/>
-          </a:fontRef>
-        </p:style>
-        <p:txBody>
-          <a:bodyPr rtlCol="0" anchor="ctr"/>
-          <a:lstStyle/>
-          <a:p>
-            <a:pPr algn="ctr"/>
+          <p:cNvPr id="2" name="Title 1">
+            <a:extLst>
+              <a:ext uri="{FF2B5EF4-FFF2-40B4-BE49-F238E27FC236}">
+                <a16:creationId xmlns:a16="http://schemas.microsoft.com/office/drawing/2014/main" id="{1FF53E0D-C0D3-DD49-9B5D-789EBCDEA886}"/>
+              </a:ext>
+            </a:extLst>
+          </p:cNvPr>
+          <p:cNvSpPr>
+            <a:spLocks noGrp="1"/>
+          </p:cNvSpPr>
+          <p:nvPr>
+            <p:ph type="title"/>
+          </p:nvPr>
+        </p:nvSpPr>
+        <p:spPr/>
+        <p:txBody>
+          <a:bodyPr/>
+          <a:lstStyle/>
+          <a:p>
             <a:endParaRPr lang="en-US"/>
           </a:p>
         </p:txBody>
       </p:sp>
       <p:sp>
         <p:nvSpPr>
-          <p:cNvPr id="4" name="TextBox 3">
-            <a:extLst>
-              <a:ext uri="{FF2B5EF4-FFF2-40B4-BE49-F238E27FC236}">
-                <a16:creationId xmlns:a16="http://schemas.microsoft.com/office/drawing/2014/main" id="{9210F2CD-7CF4-5743-A46C-D4B07EDCEBC8}"/>
-              </a:ext>
-            </a:extLst>
-          </p:cNvPr>
-          <p:cNvSpPr txBox="1"/>
-          <p:nvPr/>
-        </p:nvSpPr>
-        <p:spPr>
-          <a:xfrm>
-            <a:off x="303402" y="207218"/>
-            <a:ext cx="11585196" cy="1291904"/>
-          </a:xfrm>
-          <a:prstGeom prst="rect">
-            <a:avLst/>
-          </a:prstGeom>
-          <a:noFill/>
-          <a:ln>
-            <a:solidFill>
-              <a:schemeClr val="accent1"/>
-            </a:solidFill>
-          </a:ln>
-        </p:spPr>
-        <p:txBody>
-          <a:bodyPr wrap="square" rtlCol="0">
-            <a:spAutoFit/>
-          </a:bodyPr>
-          <a:lstStyle/>
-          <a:p>
-            <a:endParaRPr lang="en-US" dirty="0"/>
-          </a:p>
-        </p:txBody>
-      </p:sp>
-      <p:sp>
-        <p:nvSpPr>
-          <p:cNvPr id="5" name="TextBox 4">
-            <a:extLst>
-              <a:ext uri="{FF2B5EF4-FFF2-40B4-BE49-F238E27FC236}">
-                <a16:creationId xmlns:a16="http://schemas.microsoft.com/office/drawing/2014/main" id="{D31B94CC-5680-654F-9BA4-E0A04DF451FB}"/>
-              </a:ext>
-            </a:extLst>
-          </p:cNvPr>
-          <p:cNvSpPr txBox="1"/>
-          <p:nvPr/>
-        </p:nvSpPr>
-        <p:spPr>
-          <a:xfrm>
-            <a:off x="479571" y="5389927"/>
-            <a:ext cx="11585196" cy="1291904"/>
-          </a:xfrm>
-          <a:prstGeom prst="rect">
-            <a:avLst/>
-          </a:prstGeom>
-          <a:noFill/>
-          <a:ln>
-            <a:solidFill>
-              <a:schemeClr val="accent1"/>
-            </a:solidFill>
-          </a:ln>
-        </p:spPr>
-        <p:txBody>
-          <a:bodyPr wrap="square" rtlCol="0">
-            <a:spAutoFit/>
-          </a:bodyPr>
-          <a:lstStyle/>
-          <a:p>
-            <a:endParaRPr lang="en-US" dirty="0"/>
-          </a:p>
-        </p:txBody>
-      </p:sp>
-      <p:sp>
-        <p:nvSpPr>
-          <p:cNvPr id="6" name="TextBox 5">
-            <a:extLst>
-              <a:ext uri="{FF2B5EF4-FFF2-40B4-BE49-F238E27FC236}">
-                <a16:creationId xmlns:a16="http://schemas.microsoft.com/office/drawing/2014/main" id="{6506E7B0-7FC8-5A45-A350-6AFE042386A6}"/>
-              </a:ext>
-            </a:extLst>
-          </p:cNvPr>
-          <p:cNvSpPr txBox="1"/>
-          <p:nvPr/>
-        </p:nvSpPr>
-        <p:spPr>
-          <a:xfrm>
-            <a:off x="8858774" y="360728"/>
-            <a:ext cx="2860646" cy="338554"/>
-          </a:xfrm>
-          <a:prstGeom prst="rect">
-            <a:avLst/>
-          </a:prstGeom>
-          <a:noFill/>
-        </p:spPr>
-        <p:txBody>
-          <a:bodyPr wrap="square" rtlCol="0">
-            <a:spAutoFit/>
-          </a:bodyPr>
-          <a:lstStyle/>
-          <a:p>
-            <a:r>
-              <a:rPr lang="en-US" sz="1600" dirty="0"/>
-              <a:t>Hi, (Doctor name)</a:t>
-            </a:r>
-          </a:p>
-        </p:txBody>
-      </p:sp>
-      <p:sp>
-        <p:nvSpPr>
-          <p:cNvPr id="7" name="TextBox 6">
-            <a:extLst>
-              <a:ext uri="{FF2B5EF4-FFF2-40B4-BE49-F238E27FC236}">
-                <a16:creationId xmlns:a16="http://schemas.microsoft.com/office/drawing/2014/main" id="{E7D745A2-1954-874D-B978-521F0D0FBC58}"/>
-              </a:ext>
-            </a:extLst>
-          </p:cNvPr>
-          <p:cNvSpPr txBox="1"/>
-          <p:nvPr/>
-        </p:nvSpPr>
-        <p:spPr>
-          <a:xfrm>
-            <a:off x="604007" y="360728"/>
-            <a:ext cx="1702965" cy="369332"/>
-          </a:xfrm>
-          <a:prstGeom prst="rect">
-            <a:avLst/>
-          </a:prstGeom>
-          <a:noFill/>
-        </p:spPr>
-        <p:txBody>
-          <a:bodyPr wrap="square" rtlCol="0">
-            <a:spAutoFit/>
-          </a:bodyPr>
-          <a:lstStyle/>
-          <a:p>
-            <a:r>
-              <a:rPr lang="en-US" dirty="0"/>
-              <a:t>LOGO</a:t>
-            </a:r>
-          </a:p>
-        </p:txBody>
-      </p:sp>
-      <p:sp>
-        <p:nvSpPr>
-          <p:cNvPr id="8" name="TextBox 7">
-            <a:extLst>
-              <a:ext uri="{FF2B5EF4-FFF2-40B4-BE49-F238E27FC236}">
-                <a16:creationId xmlns:a16="http://schemas.microsoft.com/office/drawing/2014/main" id="{955242FB-1453-5E4A-B9AC-9E4ACD40FBE2}"/>
-              </a:ext>
-            </a:extLst>
-          </p:cNvPr>
-          <p:cNvSpPr txBox="1"/>
-          <p:nvPr/>
-        </p:nvSpPr>
-        <p:spPr>
-          <a:xfrm>
-            <a:off x="10975596" y="1118802"/>
-            <a:ext cx="1073791" cy="307777"/>
-          </a:xfrm>
-          <a:prstGeom prst="rect">
-            <a:avLst/>
-          </a:prstGeom>
-          <a:noFill/>
-        </p:spPr>
-        <p:txBody>
-          <a:bodyPr wrap="square" rtlCol="0">
-            <a:spAutoFit/>
-          </a:bodyPr>
-          <a:lstStyle/>
-          <a:p>
-            <a:r>
-              <a:rPr lang="en-US" sz="1400" dirty="0"/>
-              <a:t>Sign out</a:t>
-            </a:r>
-          </a:p>
-        </p:txBody>
-      </p:sp>
-      <p:sp>
-        <p:nvSpPr>
-          <p:cNvPr id="13" name="TextBox 12">
-            <a:extLst>
-              <a:ext uri="{FF2B5EF4-FFF2-40B4-BE49-F238E27FC236}">
-                <a16:creationId xmlns:a16="http://schemas.microsoft.com/office/drawing/2014/main" id="{6D3B998B-4F2D-1944-A306-E02E48B4D9C8}"/>
-              </a:ext>
-            </a:extLst>
-          </p:cNvPr>
-          <p:cNvSpPr txBox="1"/>
-          <p:nvPr/>
-        </p:nvSpPr>
-        <p:spPr>
-          <a:xfrm>
-            <a:off x="679508" y="1007059"/>
-            <a:ext cx="1266738" cy="369332"/>
-          </a:xfrm>
-          <a:prstGeom prst="rect">
-            <a:avLst/>
-          </a:prstGeom>
-          <a:noFill/>
-        </p:spPr>
-        <p:txBody>
-          <a:bodyPr wrap="square" rtlCol="0">
-            <a:spAutoFit/>
-          </a:bodyPr>
-          <a:lstStyle/>
-          <a:p>
-            <a:r>
-              <a:rPr lang="en-US" dirty="0"/>
-              <a:t>Home</a:t>
-            </a:r>
-          </a:p>
-        </p:txBody>
-      </p:sp>
-      <p:sp>
-        <p:nvSpPr>
-          <p:cNvPr id="14" name="TextBox 13">
-            <a:extLst>
-              <a:ext uri="{FF2B5EF4-FFF2-40B4-BE49-F238E27FC236}">
-                <a16:creationId xmlns:a16="http://schemas.microsoft.com/office/drawing/2014/main" id="{7234AEA2-AEC3-0844-BDC9-78282380EB27}"/>
-              </a:ext>
-            </a:extLst>
-          </p:cNvPr>
-          <p:cNvSpPr txBox="1"/>
-          <p:nvPr/>
-        </p:nvSpPr>
-        <p:spPr>
-          <a:xfrm>
-            <a:off x="1149292" y="5403711"/>
-            <a:ext cx="1266738" cy="646331"/>
-          </a:xfrm>
-          <a:prstGeom prst="rect">
-            <a:avLst/>
-          </a:prstGeom>
-          <a:noFill/>
-        </p:spPr>
-        <p:txBody>
-          <a:bodyPr wrap="square" rtlCol="0">
-            <a:spAutoFit/>
-          </a:bodyPr>
-          <a:lstStyle/>
-          <a:p>
-            <a:r>
-              <a:rPr lang="en-US" dirty="0"/>
-              <a:t>Contact Details</a:t>
-            </a:r>
-          </a:p>
-        </p:txBody>
-      </p:sp>
-      <p:sp>
-        <p:nvSpPr>
-          <p:cNvPr id="15" name="TextBox 14">
-            <a:extLst>
-              <a:ext uri="{FF2B5EF4-FFF2-40B4-BE49-F238E27FC236}">
-                <a16:creationId xmlns:a16="http://schemas.microsoft.com/office/drawing/2014/main" id="{BBB57AFB-704D-B24F-8BE1-DE3DB4972EF5}"/>
-              </a:ext>
-            </a:extLst>
-          </p:cNvPr>
-          <p:cNvSpPr txBox="1"/>
-          <p:nvPr/>
-        </p:nvSpPr>
-        <p:spPr>
-          <a:xfrm>
-            <a:off x="4769140" y="356344"/>
-            <a:ext cx="2189527" cy="646331"/>
-          </a:xfrm>
-          <a:prstGeom prst="rect">
-            <a:avLst/>
-          </a:prstGeom>
-          <a:noFill/>
-        </p:spPr>
-        <p:txBody>
-          <a:bodyPr wrap="square" rtlCol="0">
-            <a:spAutoFit/>
-          </a:bodyPr>
-          <a:lstStyle/>
-          <a:p>
-            <a:r>
-              <a:rPr lang="en-US" dirty="0"/>
-              <a:t>Doctor Access</a:t>
-            </a:r>
-          </a:p>
-          <a:p>
-            <a:r>
-              <a:rPr lang="en-US" dirty="0"/>
-              <a:t>(Hospital Name)</a:t>
-            </a:r>
-          </a:p>
-        </p:txBody>
-      </p:sp>
-      <p:sp>
-        <p:nvSpPr>
-          <p:cNvPr id="17" name="TextBox 16">
-            <a:extLst>
-              <a:ext uri="{FF2B5EF4-FFF2-40B4-BE49-F238E27FC236}">
-                <a16:creationId xmlns:a16="http://schemas.microsoft.com/office/drawing/2014/main" id="{050A665A-C98A-B44A-8A44-D61414C70B12}"/>
-              </a:ext>
-            </a:extLst>
-          </p:cNvPr>
-          <p:cNvSpPr txBox="1"/>
-          <p:nvPr/>
-        </p:nvSpPr>
-        <p:spPr>
-          <a:xfrm>
-            <a:off x="10389765" y="5462434"/>
-            <a:ext cx="1266738" cy="369332"/>
-          </a:xfrm>
-          <a:prstGeom prst="rect">
-            <a:avLst/>
-          </a:prstGeom>
-          <a:noFill/>
-        </p:spPr>
-        <p:txBody>
-          <a:bodyPr wrap="square" rtlCol="0">
-            <a:spAutoFit/>
-          </a:bodyPr>
-          <a:lstStyle/>
-          <a:p>
-            <a:r>
-              <a:rPr lang="en-US" dirty="0"/>
-              <a:t>Copyright</a:t>
-            </a:r>
-          </a:p>
-        </p:txBody>
-      </p:sp>
-      <p:sp>
-        <p:nvSpPr>
-          <p:cNvPr id="19" name="TextBox 18">
-            <a:extLst>
-              <a:ext uri="{FF2B5EF4-FFF2-40B4-BE49-F238E27FC236}">
-                <a16:creationId xmlns:a16="http://schemas.microsoft.com/office/drawing/2014/main" id="{70561B6D-D157-8A49-ABED-A54D0725474B}"/>
-              </a:ext>
-            </a:extLst>
-          </p:cNvPr>
-          <p:cNvSpPr txBox="1"/>
-          <p:nvPr/>
-        </p:nvSpPr>
-        <p:spPr>
-          <a:xfrm>
-            <a:off x="9708857" y="1109391"/>
-            <a:ext cx="1266739" cy="338554"/>
-          </a:xfrm>
-          <a:prstGeom prst="rect">
-            <a:avLst/>
-          </a:prstGeom>
-          <a:noFill/>
-        </p:spPr>
-        <p:txBody>
-          <a:bodyPr wrap="square" rtlCol="0">
-            <a:spAutoFit/>
-          </a:bodyPr>
-          <a:lstStyle/>
-          <a:p>
-            <a:r>
-              <a:rPr lang="en-US" sz="1600" dirty="0"/>
-              <a:t>Messages</a:t>
-            </a:r>
-          </a:p>
-        </p:txBody>
-      </p:sp>
-      <p:sp>
-        <p:nvSpPr>
-          <p:cNvPr id="20" name="TextBox 19">
-            <a:extLst>
-              <a:ext uri="{FF2B5EF4-FFF2-40B4-BE49-F238E27FC236}">
-                <a16:creationId xmlns:a16="http://schemas.microsoft.com/office/drawing/2014/main" id="{CC7689EE-3C59-2445-89B7-7E7BC7106C27}"/>
-              </a:ext>
-            </a:extLst>
-          </p:cNvPr>
-          <p:cNvSpPr txBox="1"/>
-          <p:nvPr/>
-        </p:nvSpPr>
-        <p:spPr>
-          <a:xfrm>
-            <a:off x="4769140" y="1847876"/>
-            <a:ext cx="2764173" cy="369332"/>
-          </a:xfrm>
-          <a:prstGeom prst="rect">
-            <a:avLst/>
-          </a:prstGeom>
-          <a:noFill/>
-        </p:spPr>
-        <p:txBody>
-          <a:bodyPr wrap="square" rtlCol="0">
-            <a:spAutoFit/>
-          </a:bodyPr>
-          <a:lstStyle/>
-          <a:p>
-            <a:r>
-              <a:rPr lang="en-US" dirty="0"/>
-              <a:t>Booking Notification</a:t>
-            </a:r>
-          </a:p>
-        </p:txBody>
-      </p:sp>
-      <p:sp>
-        <p:nvSpPr>
-          <p:cNvPr id="25" name="TextBox 24">
-            <a:extLst>
-              <a:ext uri="{FF2B5EF4-FFF2-40B4-BE49-F238E27FC236}">
-                <a16:creationId xmlns:a16="http://schemas.microsoft.com/office/drawing/2014/main" id="{1BFA3CFC-E9F0-1D4D-B22F-9E62711B9D7A}"/>
-              </a:ext>
-            </a:extLst>
-          </p:cNvPr>
-          <p:cNvSpPr txBox="1"/>
-          <p:nvPr/>
-        </p:nvSpPr>
-        <p:spPr>
-          <a:xfrm>
-            <a:off x="3148318" y="2378384"/>
-            <a:ext cx="2271319" cy="369332"/>
-          </a:xfrm>
-          <a:prstGeom prst="rect">
-            <a:avLst/>
-          </a:prstGeom>
-          <a:noFill/>
-        </p:spPr>
-        <p:txBody>
-          <a:bodyPr wrap="square" rtlCol="0">
-            <a:spAutoFit/>
-          </a:bodyPr>
-          <a:lstStyle/>
-          <a:p>
-            <a:r>
-              <a:rPr lang="en-US" dirty="0"/>
-              <a:t>Details of Booking</a:t>
-            </a:r>
-          </a:p>
-        </p:txBody>
-      </p:sp>
-      <p:sp>
-        <p:nvSpPr>
-          <p:cNvPr id="21" name="TextBox 20">
-            <a:extLst>
-              <a:ext uri="{FF2B5EF4-FFF2-40B4-BE49-F238E27FC236}">
-                <a16:creationId xmlns:a16="http://schemas.microsoft.com/office/drawing/2014/main" id="{E7A802C5-ED52-3745-8A57-7A1ED52EC361}"/>
-              </a:ext>
-            </a:extLst>
-          </p:cNvPr>
-          <p:cNvSpPr txBox="1"/>
-          <p:nvPr/>
-        </p:nvSpPr>
-        <p:spPr>
-          <a:xfrm>
-            <a:off x="6944684" y="3078349"/>
-            <a:ext cx="2764173" cy="923330"/>
-          </a:xfrm>
-          <a:prstGeom prst="rect">
-            <a:avLst/>
-          </a:prstGeom>
-          <a:noFill/>
-        </p:spPr>
-        <p:txBody>
-          <a:bodyPr wrap="square" rtlCol="0">
-            <a:spAutoFit/>
-          </a:bodyPr>
-          <a:lstStyle/>
-          <a:p>
-            <a:r>
-              <a:rPr lang="en-US" dirty="0">
-                <a:solidFill>
-                  <a:srgbClr val="00B0F0"/>
-                </a:solidFill>
-              </a:rPr>
-              <a:t>Historical Patient Record (list in descending order (date))</a:t>
-            </a:r>
-          </a:p>
-        </p:txBody>
-      </p:sp>
-      <p:sp>
-        <p:nvSpPr>
-          <p:cNvPr id="22" name="TextBox 21">
-            <a:extLst>
-              <a:ext uri="{FF2B5EF4-FFF2-40B4-BE49-F238E27FC236}">
-                <a16:creationId xmlns:a16="http://schemas.microsoft.com/office/drawing/2014/main" id="{8D8CBB7B-797F-B446-BFCC-CCD87CDF58C4}"/>
-              </a:ext>
-            </a:extLst>
-          </p:cNvPr>
-          <p:cNvSpPr txBox="1"/>
-          <p:nvPr/>
-        </p:nvSpPr>
-        <p:spPr>
-          <a:xfrm>
-            <a:off x="1442558" y="807958"/>
-            <a:ext cx="1979102" cy="738664"/>
-          </a:xfrm>
-          <a:prstGeom prst="rect">
-            <a:avLst/>
-          </a:prstGeom>
-          <a:noFill/>
-        </p:spPr>
-        <p:txBody>
-          <a:bodyPr wrap="square" rtlCol="0">
-            <a:spAutoFit/>
-          </a:bodyPr>
-          <a:lstStyle/>
-          <a:p>
-            <a:r>
-              <a:rPr lang="en-US" sz="1400" dirty="0"/>
-              <a:t>View appointment(historical record alongside)</a:t>
-            </a:r>
-          </a:p>
-        </p:txBody>
-      </p:sp>
-      <p:sp>
-        <p:nvSpPr>
-          <p:cNvPr id="23" name="TextBox 22">
-            <a:extLst>
-              <a:ext uri="{FF2B5EF4-FFF2-40B4-BE49-F238E27FC236}">
-                <a16:creationId xmlns:a16="http://schemas.microsoft.com/office/drawing/2014/main" id="{4267C011-2719-BA4E-B215-0F38E906CC91}"/>
-              </a:ext>
-            </a:extLst>
-          </p:cNvPr>
-          <p:cNvSpPr txBox="1"/>
-          <p:nvPr/>
-        </p:nvSpPr>
-        <p:spPr>
-          <a:xfrm>
-            <a:off x="3391253" y="954576"/>
-            <a:ext cx="2009162" cy="584775"/>
-          </a:xfrm>
-          <a:prstGeom prst="rect">
-            <a:avLst/>
-          </a:prstGeom>
-          <a:noFill/>
-        </p:spPr>
-        <p:txBody>
-          <a:bodyPr wrap="square" rtlCol="0">
-            <a:spAutoFit/>
-          </a:bodyPr>
-          <a:lstStyle/>
-          <a:p>
-            <a:r>
-              <a:rPr lang="en-US" sz="1600" dirty="0"/>
-              <a:t>Update Patient records</a:t>
-            </a:r>
-          </a:p>
-        </p:txBody>
-      </p:sp>
-      <p:sp>
-        <p:nvSpPr>
-          <p:cNvPr id="24" name="TextBox 23">
-            <a:extLst>
-              <a:ext uri="{FF2B5EF4-FFF2-40B4-BE49-F238E27FC236}">
-                <a16:creationId xmlns:a16="http://schemas.microsoft.com/office/drawing/2014/main" id="{B033286C-DE33-084A-845F-303A3F7EBA69}"/>
-              </a:ext>
-            </a:extLst>
-          </p:cNvPr>
-          <p:cNvSpPr txBox="1"/>
-          <p:nvPr/>
-        </p:nvSpPr>
-        <p:spPr>
-          <a:xfrm>
-            <a:off x="3148319" y="2770572"/>
-            <a:ext cx="1620822" cy="307777"/>
-          </a:xfrm>
-          <a:prstGeom prst="rect">
-            <a:avLst/>
-          </a:prstGeom>
-          <a:noFill/>
-        </p:spPr>
-        <p:txBody>
-          <a:bodyPr wrap="square" rtlCol="0">
-            <a:spAutoFit/>
-          </a:bodyPr>
-          <a:lstStyle/>
-          <a:p>
-            <a:r>
-              <a:rPr lang="en-US" sz="1400" dirty="0"/>
-              <a:t>Patient Name</a:t>
-            </a:r>
-          </a:p>
-        </p:txBody>
-      </p:sp>
-      <p:sp>
-        <p:nvSpPr>
-          <p:cNvPr id="26" name="TextBox 25">
-            <a:extLst>
-              <a:ext uri="{FF2B5EF4-FFF2-40B4-BE49-F238E27FC236}">
-                <a16:creationId xmlns:a16="http://schemas.microsoft.com/office/drawing/2014/main" id="{FC5E8B0C-A499-6345-B1D0-D0628D278091}"/>
-              </a:ext>
-            </a:extLst>
-          </p:cNvPr>
-          <p:cNvSpPr txBox="1"/>
-          <p:nvPr/>
-        </p:nvSpPr>
-        <p:spPr>
-          <a:xfrm>
-            <a:off x="3148318" y="3025594"/>
-            <a:ext cx="1620822" cy="307777"/>
-          </a:xfrm>
-          <a:prstGeom prst="rect">
-            <a:avLst/>
-          </a:prstGeom>
-          <a:noFill/>
-        </p:spPr>
-        <p:txBody>
-          <a:bodyPr wrap="square" rtlCol="0">
-            <a:spAutoFit/>
-          </a:bodyPr>
-          <a:lstStyle/>
-          <a:p>
-            <a:r>
-              <a:rPr lang="en-US" sz="1400" dirty="0"/>
-              <a:t>Patient ID</a:t>
-            </a:r>
-          </a:p>
-        </p:txBody>
-      </p:sp>
-      <p:sp>
-        <p:nvSpPr>
-          <p:cNvPr id="27" name="TextBox 26">
-            <a:extLst>
-              <a:ext uri="{FF2B5EF4-FFF2-40B4-BE49-F238E27FC236}">
-                <a16:creationId xmlns:a16="http://schemas.microsoft.com/office/drawing/2014/main" id="{6D259806-BC09-0F41-95A3-6BFC5076EE89}"/>
-              </a:ext>
-            </a:extLst>
-          </p:cNvPr>
-          <p:cNvSpPr txBox="1"/>
-          <p:nvPr/>
-        </p:nvSpPr>
-        <p:spPr>
-          <a:xfrm>
-            <a:off x="3148318" y="3293142"/>
-            <a:ext cx="1620822" cy="307777"/>
-          </a:xfrm>
-          <a:prstGeom prst="rect">
-            <a:avLst/>
-          </a:prstGeom>
-          <a:noFill/>
-        </p:spPr>
-        <p:txBody>
-          <a:bodyPr wrap="square" rtlCol="0">
-            <a:spAutoFit/>
-          </a:bodyPr>
-          <a:lstStyle/>
-          <a:p>
-            <a:r>
-              <a:rPr lang="en-US" sz="1400" dirty="0"/>
-              <a:t>Problem</a:t>
-            </a:r>
-          </a:p>
-        </p:txBody>
-      </p:sp>
-      <p:sp>
-        <p:nvSpPr>
-          <p:cNvPr id="28" name="TextBox 27">
-            <a:extLst>
-              <a:ext uri="{FF2B5EF4-FFF2-40B4-BE49-F238E27FC236}">
-                <a16:creationId xmlns:a16="http://schemas.microsoft.com/office/drawing/2014/main" id="{55B8D09B-FF36-B142-AB9A-77915E7DAE15}"/>
-              </a:ext>
-            </a:extLst>
-          </p:cNvPr>
-          <p:cNvSpPr txBox="1"/>
-          <p:nvPr/>
-        </p:nvSpPr>
-        <p:spPr>
-          <a:xfrm>
-            <a:off x="3148318" y="3588393"/>
-            <a:ext cx="1620822" cy="307777"/>
-          </a:xfrm>
-          <a:prstGeom prst="rect">
-            <a:avLst/>
-          </a:prstGeom>
-          <a:noFill/>
-        </p:spPr>
-        <p:txBody>
-          <a:bodyPr wrap="square" rtlCol="0">
-            <a:spAutoFit/>
-          </a:bodyPr>
-          <a:lstStyle/>
-          <a:p>
-            <a:r>
-              <a:rPr lang="en-US" sz="1400" dirty="0"/>
-              <a:t>Date</a:t>
-            </a:r>
-          </a:p>
-        </p:txBody>
-      </p:sp>
-      <p:sp>
-        <p:nvSpPr>
-          <p:cNvPr id="29" name="TextBox 28">
-            <a:extLst>
-              <a:ext uri="{FF2B5EF4-FFF2-40B4-BE49-F238E27FC236}">
-                <a16:creationId xmlns:a16="http://schemas.microsoft.com/office/drawing/2014/main" id="{2CB5B87F-31B5-B24D-A222-2DEEC2EADBB1}"/>
-              </a:ext>
-            </a:extLst>
-          </p:cNvPr>
-          <p:cNvSpPr txBox="1"/>
-          <p:nvPr/>
-        </p:nvSpPr>
-        <p:spPr>
-          <a:xfrm>
-            <a:off x="6952025" y="2375552"/>
-            <a:ext cx="2271319" cy="646331"/>
-          </a:xfrm>
-          <a:prstGeom prst="rect">
-            <a:avLst/>
-          </a:prstGeom>
-          <a:noFill/>
-        </p:spPr>
-        <p:txBody>
-          <a:bodyPr wrap="square" rtlCol="0">
-            <a:spAutoFit/>
-          </a:bodyPr>
-          <a:lstStyle/>
-          <a:p>
-            <a:r>
-              <a:rPr lang="en-US" dirty="0"/>
-              <a:t>View Record (button (optional))</a:t>
-            </a:r>
-          </a:p>
-        </p:txBody>
-      </p:sp>
-      <p:sp>
-        <p:nvSpPr>
-          <p:cNvPr id="30" name="TextBox 29">
-            <a:extLst>
-              <a:ext uri="{FF2B5EF4-FFF2-40B4-BE49-F238E27FC236}">
-                <a16:creationId xmlns:a16="http://schemas.microsoft.com/office/drawing/2014/main" id="{4BBF072A-3BAE-7F4A-89AE-7ACC1A19BAF2}"/>
-              </a:ext>
-            </a:extLst>
-          </p:cNvPr>
-          <p:cNvSpPr txBox="1"/>
-          <p:nvPr/>
-        </p:nvSpPr>
-        <p:spPr>
-          <a:xfrm>
-            <a:off x="2775012" y="4028283"/>
-            <a:ext cx="1620822" cy="461665"/>
-          </a:xfrm>
-          <a:prstGeom prst="rect">
-            <a:avLst/>
-          </a:prstGeom>
-          <a:noFill/>
-        </p:spPr>
-        <p:txBody>
-          <a:bodyPr wrap="square" rtlCol="0">
-            <a:spAutoFit/>
-          </a:bodyPr>
-          <a:lstStyle/>
-          <a:p>
-            <a:r>
-              <a:rPr lang="en-US" sz="1200" dirty="0"/>
-              <a:t>Confirm Booking button</a:t>
-            </a:r>
-          </a:p>
-        </p:txBody>
-      </p:sp>
-      <p:sp>
-        <p:nvSpPr>
-          <p:cNvPr id="31" name="TextBox 30">
-            <a:extLst>
-              <a:ext uri="{FF2B5EF4-FFF2-40B4-BE49-F238E27FC236}">
-                <a16:creationId xmlns:a16="http://schemas.microsoft.com/office/drawing/2014/main" id="{89E6FD07-9628-C545-9088-04E468BB4D5C}"/>
-              </a:ext>
-            </a:extLst>
-          </p:cNvPr>
-          <p:cNvSpPr txBox="1"/>
-          <p:nvPr/>
-        </p:nvSpPr>
-        <p:spPr>
-          <a:xfrm>
-            <a:off x="3989488" y="4028283"/>
-            <a:ext cx="1620822" cy="461665"/>
-          </a:xfrm>
-          <a:prstGeom prst="rect">
-            <a:avLst/>
-          </a:prstGeom>
-          <a:noFill/>
-        </p:spPr>
-        <p:txBody>
-          <a:bodyPr wrap="square" rtlCol="0">
-            <a:spAutoFit/>
-          </a:bodyPr>
-          <a:lstStyle/>
-          <a:p>
-            <a:r>
-              <a:rPr lang="en-US" sz="1200" dirty="0"/>
-              <a:t>Reschedule Booking button</a:t>
-            </a:r>
-          </a:p>
-        </p:txBody>
-      </p:sp>
+          <p:cNvPr id="3" name="Content Placeholder 2">
+            <a:extLst>
+              <a:ext uri="{FF2B5EF4-FFF2-40B4-BE49-F238E27FC236}">
+                <a16:creationId xmlns:a16="http://schemas.microsoft.com/office/drawing/2014/main" id="{E18E819D-B91A-574F-81C2-F3D0275A0870}"/>
+              </a:ext>
+            </a:extLst>
+          </p:cNvPr>
+          <p:cNvSpPr>
+            <a:spLocks noGrp="1"/>
+          </p:cNvSpPr>
+          <p:nvPr>
+            <p:ph idx="1"/>
+          </p:nvPr>
+        </p:nvSpPr>
+        <p:spPr/>
+        <p:txBody>
+          <a:bodyPr/>
+          <a:lstStyle/>
+          <a:p>
+            <a:endParaRPr lang="en-US" dirty="0">
+              <a:solidFill>
+                <a:srgbClr val="3488AA"/>
+              </a:solidFill>
+            </a:endParaRPr>
+          </a:p>
+        </p:txBody>
+      </p:sp>
+      <p:grpSp>
+        <p:nvGrpSpPr>
+          <p:cNvPr id="14" name="Group 13">
+            <a:extLst>
+              <a:ext uri="{FF2B5EF4-FFF2-40B4-BE49-F238E27FC236}">
+                <a16:creationId xmlns:a16="http://schemas.microsoft.com/office/drawing/2014/main" id="{B9DB91C5-4A45-F741-A29F-B9EAF0DCB495}"/>
+              </a:ext>
+            </a:extLst>
+          </p:cNvPr>
+          <p:cNvGrpSpPr/>
+          <p:nvPr/>
+        </p:nvGrpSpPr>
+        <p:grpSpPr>
+          <a:xfrm>
+            <a:off x="8039100" y="1945154"/>
+            <a:ext cx="1723030" cy="2772685"/>
+            <a:chOff x="8039100" y="1945154"/>
+            <a:chExt cx="1723030" cy="2772685"/>
+          </a:xfrm>
+        </p:grpSpPr>
+        <p:pic>
+          <p:nvPicPr>
+            <p:cNvPr id="7" name="Graphic 6" descr="Medical with solid fill">
+              <a:extLst>
+                <a:ext uri="{FF2B5EF4-FFF2-40B4-BE49-F238E27FC236}">
+                  <a16:creationId xmlns:a16="http://schemas.microsoft.com/office/drawing/2014/main" id="{4BF07342-6A37-DA42-8B90-8532D1CEF8C9}"/>
+                </a:ext>
+              </a:extLst>
+            </p:cNvPr>
+            <p:cNvPicPr>
+              <a:picLocks noChangeAspect="1"/>
+            </p:cNvPicPr>
+            <p:nvPr/>
+          </p:nvPicPr>
+          <p:blipFill>
+            <a:blip r:embed="rId2">
+              <a:extLst>
+                <a:ext uri="{96DAC541-7B7A-43D3-8B79-37D633B846F1}">
+                  <asvg:svgBlip xmlns:asvg="http://schemas.microsoft.com/office/drawing/2016/SVG/main" r:embed="rId3"/>
+                </a:ext>
+              </a:extLst>
+            </a:blip>
+            <a:stretch>
+              <a:fillRect/>
+            </a:stretch>
+          </p:blipFill>
+          <p:spPr>
+            <a:xfrm>
+              <a:off x="8039100" y="2567485"/>
+              <a:ext cx="1723030" cy="1723030"/>
+            </a:xfrm>
+            <a:prstGeom prst="rect">
+              <a:avLst/>
+            </a:prstGeom>
+          </p:spPr>
+        </p:pic>
+        <p:sp>
+          <p:nvSpPr>
+            <p:cNvPr id="9" name="Rectangle 8">
+              <a:extLst>
+                <a:ext uri="{FF2B5EF4-FFF2-40B4-BE49-F238E27FC236}">
+                  <a16:creationId xmlns:a16="http://schemas.microsoft.com/office/drawing/2014/main" id="{1275CB79-3667-E94D-B278-252CF80A3C31}"/>
+                </a:ext>
+              </a:extLst>
+            </p:cNvPr>
+            <p:cNvSpPr/>
+            <p:nvPr/>
+          </p:nvSpPr>
+          <p:spPr>
+            <a:xfrm>
+              <a:off x="8122997" y="1945154"/>
+              <a:ext cx="1555234" cy="923330"/>
+            </a:xfrm>
+            <a:prstGeom prst="rect">
+              <a:avLst/>
+            </a:prstGeom>
+            <a:noFill/>
+          </p:spPr>
+          <p:txBody>
+            <a:bodyPr wrap="none" lIns="91440" tIns="45720" rIns="91440" bIns="45720">
+              <a:spAutoFit/>
+              <a:scene3d>
+                <a:camera prst="orthographicFront"/>
+                <a:lightRig rig="harsh" dir="t"/>
+              </a:scene3d>
+              <a:sp3d extrusionH="57150" prstMaterial="matte">
+                <a:bevelT w="63500" h="12700" prst="angle"/>
+                <a:contourClr>
+                  <a:schemeClr val="bg1">
+                    <a:lumMod val="65000"/>
+                  </a:schemeClr>
+                </a:contourClr>
+              </a:sp3d>
+            </a:bodyPr>
+            <a:lstStyle/>
+            <a:p>
+              <a:pPr algn="ctr"/>
+              <a:r>
+                <a:rPr lang="en-GB" sz="5400" b="1" cap="none" spc="0" dirty="0">
+                  <a:ln/>
+                  <a:solidFill>
+                    <a:srgbClr val="3488AA"/>
+                  </a:solidFill>
+                  <a:effectLst/>
+                </a:rPr>
+                <a:t>HMS</a:t>
+              </a:r>
+            </a:p>
+          </p:txBody>
+        </p:sp>
+        <p:sp>
+          <p:nvSpPr>
+            <p:cNvPr id="10" name="Rectangle 9">
+              <a:extLst>
+                <a:ext uri="{FF2B5EF4-FFF2-40B4-BE49-F238E27FC236}">
+                  <a16:creationId xmlns:a16="http://schemas.microsoft.com/office/drawing/2014/main" id="{37A75375-953D-7344-965F-F24B9ABD474C}"/>
+                </a:ext>
+              </a:extLst>
+            </p:cNvPr>
+            <p:cNvSpPr/>
+            <p:nvPr/>
+          </p:nvSpPr>
+          <p:spPr>
+            <a:xfrm>
+              <a:off x="8095746" y="4133064"/>
+              <a:ext cx="1609736" cy="584775"/>
+            </a:xfrm>
+            <a:prstGeom prst="rect">
+              <a:avLst/>
+            </a:prstGeom>
+            <a:noFill/>
+          </p:spPr>
+          <p:txBody>
+            <a:bodyPr wrap="square" lIns="91440" tIns="45720" rIns="91440" bIns="45720">
+              <a:spAutoFit/>
+              <a:scene3d>
+                <a:camera prst="orthographicFront"/>
+                <a:lightRig rig="harsh" dir="t"/>
+              </a:scene3d>
+              <a:sp3d extrusionH="57150" prstMaterial="matte">
+                <a:bevelT w="63500" h="12700" prst="angle"/>
+                <a:contourClr>
+                  <a:schemeClr val="bg1">
+                    <a:lumMod val="65000"/>
+                  </a:schemeClr>
+                </a:contourClr>
+              </a:sp3d>
+            </a:bodyPr>
+            <a:lstStyle/>
+            <a:p>
+              <a:pPr algn="ctr"/>
+              <a:r>
+                <a:rPr lang="en-GB" sz="3200" b="1" cap="none" spc="0" dirty="0">
+                  <a:ln/>
+                  <a:solidFill>
+                    <a:srgbClr val="3488AA"/>
+                  </a:solidFill>
+                  <a:effectLst/>
+                </a:rPr>
+                <a:t>We Care</a:t>
+              </a:r>
+            </a:p>
+          </p:txBody>
+        </p:sp>
+      </p:grpSp>
     </p:spTree>
     <p:extLst>
       <p:ext uri="{BB962C8B-B14F-4D97-AF65-F5344CB8AC3E}">
-        <p14:creationId xmlns:p14="http://schemas.microsoft.com/office/powerpoint/2010/main" val="2024253038"/>
+        <p14:creationId xmlns:p14="http://schemas.microsoft.com/office/powerpoint/2010/main" val="1282279574"/>
       </p:ext>
     </p:extLst>
   </p:cSld>
@@ -5690,6 +5083,868 @@
       </p:sp>
       <p:sp>
         <p:nvSpPr>
+          <p:cNvPr id="20" name="TextBox 19">
+            <a:extLst>
+              <a:ext uri="{FF2B5EF4-FFF2-40B4-BE49-F238E27FC236}">
+                <a16:creationId xmlns:a16="http://schemas.microsoft.com/office/drawing/2014/main" id="{CC7689EE-3C59-2445-89B7-7E7BC7106C27}"/>
+              </a:ext>
+            </a:extLst>
+          </p:cNvPr>
+          <p:cNvSpPr txBox="1"/>
+          <p:nvPr/>
+        </p:nvSpPr>
+        <p:spPr>
+          <a:xfrm>
+            <a:off x="4769140" y="1847876"/>
+            <a:ext cx="2764173" cy="369332"/>
+          </a:xfrm>
+          <a:prstGeom prst="rect">
+            <a:avLst/>
+          </a:prstGeom>
+          <a:noFill/>
+        </p:spPr>
+        <p:txBody>
+          <a:bodyPr wrap="square" rtlCol="0">
+            <a:spAutoFit/>
+          </a:bodyPr>
+          <a:lstStyle/>
+          <a:p>
+            <a:r>
+              <a:rPr lang="en-US" dirty="0"/>
+              <a:t>Booking Notification</a:t>
+            </a:r>
+          </a:p>
+        </p:txBody>
+      </p:sp>
+      <p:sp>
+        <p:nvSpPr>
+          <p:cNvPr id="25" name="TextBox 24">
+            <a:extLst>
+              <a:ext uri="{FF2B5EF4-FFF2-40B4-BE49-F238E27FC236}">
+                <a16:creationId xmlns:a16="http://schemas.microsoft.com/office/drawing/2014/main" id="{1BFA3CFC-E9F0-1D4D-B22F-9E62711B9D7A}"/>
+              </a:ext>
+            </a:extLst>
+          </p:cNvPr>
+          <p:cNvSpPr txBox="1"/>
+          <p:nvPr/>
+        </p:nvSpPr>
+        <p:spPr>
+          <a:xfrm>
+            <a:off x="3148318" y="2378384"/>
+            <a:ext cx="2271319" cy="369332"/>
+          </a:xfrm>
+          <a:prstGeom prst="rect">
+            <a:avLst/>
+          </a:prstGeom>
+          <a:noFill/>
+        </p:spPr>
+        <p:txBody>
+          <a:bodyPr wrap="square" rtlCol="0">
+            <a:spAutoFit/>
+          </a:bodyPr>
+          <a:lstStyle/>
+          <a:p>
+            <a:r>
+              <a:rPr lang="en-US" dirty="0"/>
+              <a:t>Details of Booking</a:t>
+            </a:r>
+          </a:p>
+        </p:txBody>
+      </p:sp>
+      <p:sp>
+        <p:nvSpPr>
+          <p:cNvPr id="21" name="TextBox 20">
+            <a:extLst>
+              <a:ext uri="{FF2B5EF4-FFF2-40B4-BE49-F238E27FC236}">
+                <a16:creationId xmlns:a16="http://schemas.microsoft.com/office/drawing/2014/main" id="{E7A802C5-ED52-3745-8A57-7A1ED52EC361}"/>
+              </a:ext>
+            </a:extLst>
+          </p:cNvPr>
+          <p:cNvSpPr txBox="1"/>
+          <p:nvPr/>
+        </p:nvSpPr>
+        <p:spPr>
+          <a:xfrm>
+            <a:off x="6944684" y="3078349"/>
+            <a:ext cx="2764173" cy="923330"/>
+          </a:xfrm>
+          <a:prstGeom prst="rect">
+            <a:avLst/>
+          </a:prstGeom>
+          <a:noFill/>
+        </p:spPr>
+        <p:txBody>
+          <a:bodyPr wrap="square" rtlCol="0">
+            <a:spAutoFit/>
+          </a:bodyPr>
+          <a:lstStyle/>
+          <a:p>
+            <a:r>
+              <a:rPr lang="en-US" dirty="0">
+                <a:solidFill>
+                  <a:srgbClr val="00B0F0"/>
+                </a:solidFill>
+              </a:rPr>
+              <a:t>Historical Patient Record (list in descending order (date))</a:t>
+            </a:r>
+          </a:p>
+        </p:txBody>
+      </p:sp>
+      <p:sp>
+        <p:nvSpPr>
+          <p:cNvPr id="22" name="TextBox 21">
+            <a:extLst>
+              <a:ext uri="{FF2B5EF4-FFF2-40B4-BE49-F238E27FC236}">
+                <a16:creationId xmlns:a16="http://schemas.microsoft.com/office/drawing/2014/main" id="{8D8CBB7B-797F-B446-BFCC-CCD87CDF58C4}"/>
+              </a:ext>
+            </a:extLst>
+          </p:cNvPr>
+          <p:cNvSpPr txBox="1"/>
+          <p:nvPr/>
+        </p:nvSpPr>
+        <p:spPr>
+          <a:xfrm>
+            <a:off x="1442558" y="807958"/>
+            <a:ext cx="1979102" cy="738664"/>
+          </a:xfrm>
+          <a:prstGeom prst="rect">
+            <a:avLst/>
+          </a:prstGeom>
+          <a:noFill/>
+        </p:spPr>
+        <p:txBody>
+          <a:bodyPr wrap="square" rtlCol="0">
+            <a:spAutoFit/>
+          </a:bodyPr>
+          <a:lstStyle/>
+          <a:p>
+            <a:r>
+              <a:rPr lang="en-US" sz="1400" dirty="0"/>
+              <a:t>View appointment(historical record alongside)</a:t>
+            </a:r>
+          </a:p>
+        </p:txBody>
+      </p:sp>
+      <p:sp>
+        <p:nvSpPr>
+          <p:cNvPr id="23" name="TextBox 22">
+            <a:extLst>
+              <a:ext uri="{FF2B5EF4-FFF2-40B4-BE49-F238E27FC236}">
+                <a16:creationId xmlns:a16="http://schemas.microsoft.com/office/drawing/2014/main" id="{4267C011-2719-BA4E-B215-0F38E906CC91}"/>
+              </a:ext>
+            </a:extLst>
+          </p:cNvPr>
+          <p:cNvSpPr txBox="1"/>
+          <p:nvPr/>
+        </p:nvSpPr>
+        <p:spPr>
+          <a:xfrm>
+            <a:off x="3391253" y="954576"/>
+            <a:ext cx="2009162" cy="584775"/>
+          </a:xfrm>
+          <a:prstGeom prst="rect">
+            <a:avLst/>
+          </a:prstGeom>
+          <a:noFill/>
+        </p:spPr>
+        <p:txBody>
+          <a:bodyPr wrap="square" rtlCol="0">
+            <a:spAutoFit/>
+          </a:bodyPr>
+          <a:lstStyle/>
+          <a:p>
+            <a:r>
+              <a:rPr lang="en-US" sz="1600" dirty="0"/>
+              <a:t>Update Patient records</a:t>
+            </a:r>
+          </a:p>
+        </p:txBody>
+      </p:sp>
+      <p:sp>
+        <p:nvSpPr>
+          <p:cNvPr id="24" name="TextBox 23">
+            <a:extLst>
+              <a:ext uri="{FF2B5EF4-FFF2-40B4-BE49-F238E27FC236}">
+                <a16:creationId xmlns:a16="http://schemas.microsoft.com/office/drawing/2014/main" id="{B033286C-DE33-084A-845F-303A3F7EBA69}"/>
+              </a:ext>
+            </a:extLst>
+          </p:cNvPr>
+          <p:cNvSpPr txBox="1"/>
+          <p:nvPr/>
+        </p:nvSpPr>
+        <p:spPr>
+          <a:xfrm>
+            <a:off x="3148319" y="2770572"/>
+            <a:ext cx="1620822" cy="307777"/>
+          </a:xfrm>
+          <a:prstGeom prst="rect">
+            <a:avLst/>
+          </a:prstGeom>
+          <a:noFill/>
+        </p:spPr>
+        <p:txBody>
+          <a:bodyPr wrap="square" rtlCol="0">
+            <a:spAutoFit/>
+          </a:bodyPr>
+          <a:lstStyle/>
+          <a:p>
+            <a:r>
+              <a:rPr lang="en-US" sz="1400" dirty="0"/>
+              <a:t>Patient Name</a:t>
+            </a:r>
+          </a:p>
+        </p:txBody>
+      </p:sp>
+      <p:sp>
+        <p:nvSpPr>
+          <p:cNvPr id="26" name="TextBox 25">
+            <a:extLst>
+              <a:ext uri="{FF2B5EF4-FFF2-40B4-BE49-F238E27FC236}">
+                <a16:creationId xmlns:a16="http://schemas.microsoft.com/office/drawing/2014/main" id="{FC5E8B0C-A499-6345-B1D0-D0628D278091}"/>
+              </a:ext>
+            </a:extLst>
+          </p:cNvPr>
+          <p:cNvSpPr txBox="1"/>
+          <p:nvPr/>
+        </p:nvSpPr>
+        <p:spPr>
+          <a:xfrm>
+            <a:off x="3148318" y="3025594"/>
+            <a:ext cx="1620822" cy="307777"/>
+          </a:xfrm>
+          <a:prstGeom prst="rect">
+            <a:avLst/>
+          </a:prstGeom>
+          <a:noFill/>
+        </p:spPr>
+        <p:txBody>
+          <a:bodyPr wrap="square" rtlCol="0">
+            <a:spAutoFit/>
+          </a:bodyPr>
+          <a:lstStyle/>
+          <a:p>
+            <a:r>
+              <a:rPr lang="en-US" sz="1400" dirty="0"/>
+              <a:t>Patient ID</a:t>
+            </a:r>
+          </a:p>
+        </p:txBody>
+      </p:sp>
+      <p:sp>
+        <p:nvSpPr>
+          <p:cNvPr id="27" name="TextBox 26">
+            <a:extLst>
+              <a:ext uri="{FF2B5EF4-FFF2-40B4-BE49-F238E27FC236}">
+                <a16:creationId xmlns:a16="http://schemas.microsoft.com/office/drawing/2014/main" id="{6D259806-BC09-0F41-95A3-6BFC5076EE89}"/>
+              </a:ext>
+            </a:extLst>
+          </p:cNvPr>
+          <p:cNvSpPr txBox="1"/>
+          <p:nvPr/>
+        </p:nvSpPr>
+        <p:spPr>
+          <a:xfrm>
+            <a:off x="3148318" y="3293142"/>
+            <a:ext cx="1620822" cy="307777"/>
+          </a:xfrm>
+          <a:prstGeom prst="rect">
+            <a:avLst/>
+          </a:prstGeom>
+          <a:noFill/>
+        </p:spPr>
+        <p:txBody>
+          <a:bodyPr wrap="square" rtlCol="0">
+            <a:spAutoFit/>
+          </a:bodyPr>
+          <a:lstStyle/>
+          <a:p>
+            <a:r>
+              <a:rPr lang="en-US" sz="1400" dirty="0"/>
+              <a:t>Problem</a:t>
+            </a:r>
+          </a:p>
+        </p:txBody>
+      </p:sp>
+      <p:sp>
+        <p:nvSpPr>
+          <p:cNvPr id="28" name="TextBox 27">
+            <a:extLst>
+              <a:ext uri="{FF2B5EF4-FFF2-40B4-BE49-F238E27FC236}">
+                <a16:creationId xmlns:a16="http://schemas.microsoft.com/office/drawing/2014/main" id="{55B8D09B-FF36-B142-AB9A-77915E7DAE15}"/>
+              </a:ext>
+            </a:extLst>
+          </p:cNvPr>
+          <p:cNvSpPr txBox="1"/>
+          <p:nvPr/>
+        </p:nvSpPr>
+        <p:spPr>
+          <a:xfrm>
+            <a:off x="3148318" y="3588393"/>
+            <a:ext cx="1620822" cy="307777"/>
+          </a:xfrm>
+          <a:prstGeom prst="rect">
+            <a:avLst/>
+          </a:prstGeom>
+          <a:noFill/>
+        </p:spPr>
+        <p:txBody>
+          <a:bodyPr wrap="square" rtlCol="0">
+            <a:spAutoFit/>
+          </a:bodyPr>
+          <a:lstStyle/>
+          <a:p>
+            <a:r>
+              <a:rPr lang="en-US" sz="1400" dirty="0"/>
+              <a:t>Date</a:t>
+            </a:r>
+          </a:p>
+        </p:txBody>
+      </p:sp>
+      <p:sp>
+        <p:nvSpPr>
+          <p:cNvPr id="29" name="TextBox 28">
+            <a:extLst>
+              <a:ext uri="{FF2B5EF4-FFF2-40B4-BE49-F238E27FC236}">
+                <a16:creationId xmlns:a16="http://schemas.microsoft.com/office/drawing/2014/main" id="{2CB5B87F-31B5-B24D-A222-2DEEC2EADBB1}"/>
+              </a:ext>
+            </a:extLst>
+          </p:cNvPr>
+          <p:cNvSpPr txBox="1"/>
+          <p:nvPr/>
+        </p:nvSpPr>
+        <p:spPr>
+          <a:xfrm>
+            <a:off x="6952025" y="2375552"/>
+            <a:ext cx="2271319" cy="646331"/>
+          </a:xfrm>
+          <a:prstGeom prst="rect">
+            <a:avLst/>
+          </a:prstGeom>
+          <a:noFill/>
+        </p:spPr>
+        <p:txBody>
+          <a:bodyPr wrap="square" rtlCol="0">
+            <a:spAutoFit/>
+          </a:bodyPr>
+          <a:lstStyle/>
+          <a:p>
+            <a:r>
+              <a:rPr lang="en-US" dirty="0"/>
+              <a:t>View Record (button (optional))</a:t>
+            </a:r>
+          </a:p>
+        </p:txBody>
+      </p:sp>
+      <p:sp>
+        <p:nvSpPr>
+          <p:cNvPr id="30" name="TextBox 29">
+            <a:extLst>
+              <a:ext uri="{FF2B5EF4-FFF2-40B4-BE49-F238E27FC236}">
+                <a16:creationId xmlns:a16="http://schemas.microsoft.com/office/drawing/2014/main" id="{4BBF072A-3BAE-7F4A-89AE-7ACC1A19BAF2}"/>
+              </a:ext>
+            </a:extLst>
+          </p:cNvPr>
+          <p:cNvSpPr txBox="1"/>
+          <p:nvPr/>
+        </p:nvSpPr>
+        <p:spPr>
+          <a:xfrm>
+            <a:off x="2775012" y="4028283"/>
+            <a:ext cx="1620822" cy="461665"/>
+          </a:xfrm>
+          <a:prstGeom prst="rect">
+            <a:avLst/>
+          </a:prstGeom>
+          <a:noFill/>
+        </p:spPr>
+        <p:txBody>
+          <a:bodyPr wrap="square" rtlCol="0">
+            <a:spAutoFit/>
+          </a:bodyPr>
+          <a:lstStyle/>
+          <a:p>
+            <a:r>
+              <a:rPr lang="en-US" sz="1200" dirty="0"/>
+              <a:t>Confirm Booking button</a:t>
+            </a:r>
+          </a:p>
+        </p:txBody>
+      </p:sp>
+      <p:sp>
+        <p:nvSpPr>
+          <p:cNvPr id="31" name="TextBox 30">
+            <a:extLst>
+              <a:ext uri="{FF2B5EF4-FFF2-40B4-BE49-F238E27FC236}">
+                <a16:creationId xmlns:a16="http://schemas.microsoft.com/office/drawing/2014/main" id="{89E6FD07-9628-C545-9088-04E468BB4D5C}"/>
+              </a:ext>
+            </a:extLst>
+          </p:cNvPr>
+          <p:cNvSpPr txBox="1"/>
+          <p:nvPr/>
+        </p:nvSpPr>
+        <p:spPr>
+          <a:xfrm>
+            <a:off x="3989488" y="4028283"/>
+            <a:ext cx="1620822" cy="461665"/>
+          </a:xfrm>
+          <a:prstGeom prst="rect">
+            <a:avLst/>
+          </a:prstGeom>
+          <a:noFill/>
+        </p:spPr>
+        <p:txBody>
+          <a:bodyPr wrap="square" rtlCol="0">
+            <a:spAutoFit/>
+          </a:bodyPr>
+          <a:lstStyle/>
+          <a:p>
+            <a:r>
+              <a:rPr lang="en-US" sz="1200" dirty="0"/>
+              <a:t>Reschedule Booking button</a:t>
+            </a:r>
+          </a:p>
+        </p:txBody>
+      </p:sp>
+    </p:spTree>
+    <p:extLst>
+      <p:ext uri="{BB962C8B-B14F-4D97-AF65-F5344CB8AC3E}">
+        <p14:creationId xmlns:p14="http://schemas.microsoft.com/office/powerpoint/2010/main" val="2024253038"/>
+      </p:ext>
+    </p:extLst>
+  </p:cSld>
+  <p:clrMapOvr>
+    <a:masterClrMapping/>
+  </p:clrMapOvr>
+</p:sld>
+</file>
+
+<file path=ppt/slides/slide13.xml><?xml version="1.0" encoding="utf-8"?>
+<p:sld xmlns:a="http://schemas.openxmlformats.org/drawingml/2006/main" xmlns:r="http://schemas.openxmlformats.org/officeDocument/2006/relationships" xmlns:p="http://schemas.openxmlformats.org/presentationml/2006/main">
+  <p:cSld>
+    <p:spTree>
+      <p:nvGrpSpPr>
+        <p:cNvPr id="1" name=""/>
+        <p:cNvGrpSpPr/>
+        <p:nvPr/>
+      </p:nvGrpSpPr>
+      <p:grpSpPr>
+        <a:xfrm>
+          <a:off x="0" y="0"/>
+          <a:ext cx="0" cy="0"/>
+          <a:chOff x="0" y="0"/>
+          <a:chExt cx="0" cy="0"/>
+        </a:xfrm>
+      </p:grpSpPr>
+      <p:sp>
+        <p:nvSpPr>
+          <p:cNvPr id="11" name="Rectangle 10">
+            <a:extLst>
+              <a:ext uri="{FF2B5EF4-FFF2-40B4-BE49-F238E27FC236}">
+                <a16:creationId xmlns:a16="http://schemas.microsoft.com/office/drawing/2014/main" id="{7834B01E-90EF-8942-9E82-155BF03FC169}"/>
+              </a:ext>
+            </a:extLst>
+          </p:cNvPr>
+          <p:cNvSpPr/>
+          <p:nvPr/>
+        </p:nvSpPr>
+        <p:spPr>
+          <a:xfrm>
+            <a:off x="2634144" y="1754144"/>
+            <a:ext cx="7122252" cy="3329584"/>
+          </a:xfrm>
+          <a:prstGeom prst="rect">
+            <a:avLst/>
+          </a:prstGeom>
+          <a:noFill/>
+          <a:ln w="19050"/>
+        </p:spPr>
+        <p:style>
+          <a:lnRef idx="2">
+            <a:schemeClr val="accent1">
+              <a:shade val="50000"/>
+            </a:schemeClr>
+          </a:lnRef>
+          <a:fillRef idx="1">
+            <a:schemeClr val="accent1"/>
+          </a:fillRef>
+          <a:effectRef idx="0">
+            <a:schemeClr val="accent1"/>
+          </a:effectRef>
+          <a:fontRef idx="minor">
+            <a:schemeClr val="lt1"/>
+          </a:fontRef>
+        </p:style>
+        <p:txBody>
+          <a:bodyPr rtlCol="0" anchor="ctr"/>
+          <a:lstStyle/>
+          <a:p>
+            <a:pPr algn="ctr"/>
+            <a:endParaRPr lang="en-US"/>
+          </a:p>
+        </p:txBody>
+      </p:sp>
+      <p:sp>
+        <p:nvSpPr>
+          <p:cNvPr id="4" name="TextBox 3">
+            <a:extLst>
+              <a:ext uri="{FF2B5EF4-FFF2-40B4-BE49-F238E27FC236}">
+                <a16:creationId xmlns:a16="http://schemas.microsoft.com/office/drawing/2014/main" id="{9210F2CD-7CF4-5743-A46C-D4B07EDCEBC8}"/>
+              </a:ext>
+            </a:extLst>
+          </p:cNvPr>
+          <p:cNvSpPr txBox="1"/>
+          <p:nvPr/>
+        </p:nvSpPr>
+        <p:spPr>
+          <a:xfrm>
+            <a:off x="303402" y="207218"/>
+            <a:ext cx="11585196" cy="1291904"/>
+          </a:xfrm>
+          <a:prstGeom prst="rect">
+            <a:avLst/>
+          </a:prstGeom>
+          <a:noFill/>
+          <a:ln>
+            <a:solidFill>
+              <a:schemeClr val="accent1"/>
+            </a:solidFill>
+          </a:ln>
+        </p:spPr>
+        <p:txBody>
+          <a:bodyPr wrap="square" rtlCol="0">
+            <a:spAutoFit/>
+          </a:bodyPr>
+          <a:lstStyle/>
+          <a:p>
+            <a:endParaRPr lang="en-US" dirty="0"/>
+          </a:p>
+        </p:txBody>
+      </p:sp>
+      <p:sp>
+        <p:nvSpPr>
+          <p:cNvPr id="5" name="TextBox 4">
+            <a:extLst>
+              <a:ext uri="{FF2B5EF4-FFF2-40B4-BE49-F238E27FC236}">
+                <a16:creationId xmlns:a16="http://schemas.microsoft.com/office/drawing/2014/main" id="{D31B94CC-5680-654F-9BA4-E0A04DF451FB}"/>
+              </a:ext>
+            </a:extLst>
+          </p:cNvPr>
+          <p:cNvSpPr txBox="1"/>
+          <p:nvPr/>
+        </p:nvSpPr>
+        <p:spPr>
+          <a:xfrm>
+            <a:off x="479571" y="5389927"/>
+            <a:ext cx="11585196" cy="1291904"/>
+          </a:xfrm>
+          <a:prstGeom prst="rect">
+            <a:avLst/>
+          </a:prstGeom>
+          <a:noFill/>
+          <a:ln>
+            <a:solidFill>
+              <a:schemeClr val="accent1"/>
+            </a:solidFill>
+          </a:ln>
+        </p:spPr>
+        <p:txBody>
+          <a:bodyPr wrap="square" rtlCol="0">
+            <a:spAutoFit/>
+          </a:bodyPr>
+          <a:lstStyle/>
+          <a:p>
+            <a:endParaRPr lang="en-US" dirty="0"/>
+          </a:p>
+        </p:txBody>
+      </p:sp>
+      <p:sp>
+        <p:nvSpPr>
+          <p:cNvPr id="6" name="TextBox 5">
+            <a:extLst>
+              <a:ext uri="{FF2B5EF4-FFF2-40B4-BE49-F238E27FC236}">
+                <a16:creationId xmlns:a16="http://schemas.microsoft.com/office/drawing/2014/main" id="{6506E7B0-7FC8-5A45-A350-6AFE042386A6}"/>
+              </a:ext>
+            </a:extLst>
+          </p:cNvPr>
+          <p:cNvSpPr txBox="1"/>
+          <p:nvPr/>
+        </p:nvSpPr>
+        <p:spPr>
+          <a:xfrm>
+            <a:off x="8858774" y="360728"/>
+            <a:ext cx="2860646" cy="338554"/>
+          </a:xfrm>
+          <a:prstGeom prst="rect">
+            <a:avLst/>
+          </a:prstGeom>
+          <a:noFill/>
+        </p:spPr>
+        <p:txBody>
+          <a:bodyPr wrap="square" rtlCol="0">
+            <a:spAutoFit/>
+          </a:bodyPr>
+          <a:lstStyle/>
+          <a:p>
+            <a:r>
+              <a:rPr lang="en-US" sz="1600" dirty="0"/>
+              <a:t>Hi, (Doctor name)</a:t>
+            </a:r>
+          </a:p>
+        </p:txBody>
+      </p:sp>
+      <p:sp>
+        <p:nvSpPr>
+          <p:cNvPr id="7" name="TextBox 6">
+            <a:extLst>
+              <a:ext uri="{FF2B5EF4-FFF2-40B4-BE49-F238E27FC236}">
+                <a16:creationId xmlns:a16="http://schemas.microsoft.com/office/drawing/2014/main" id="{E7D745A2-1954-874D-B978-521F0D0FBC58}"/>
+              </a:ext>
+            </a:extLst>
+          </p:cNvPr>
+          <p:cNvSpPr txBox="1"/>
+          <p:nvPr/>
+        </p:nvSpPr>
+        <p:spPr>
+          <a:xfrm>
+            <a:off x="604007" y="360728"/>
+            <a:ext cx="1702965" cy="369332"/>
+          </a:xfrm>
+          <a:prstGeom prst="rect">
+            <a:avLst/>
+          </a:prstGeom>
+          <a:noFill/>
+        </p:spPr>
+        <p:txBody>
+          <a:bodyPr wrap="square" rtlCol="0">
+            <a:spAutoFit/>
+          </a:bodyPr>
+          <a:lstStyle/>
+          <a:p>
+            <a:r>
+              <a:rPr lang="en-US" dirty="0"/>
+              <a:t>LOGO</a:t>
+            </a:r>
+          </a:p>
+        </p:txBody>
+      </p:sp>
+      <p:sp>
+        <p:nvSpPr>
+          <p:cNvPr id="8" name="TextBox 7">
+            <a:extLst>
+              <a:ext uri="{FF2B5EF4-FFF2-40B4-BE49-F238E27FC236}">
+                <a16:creationId xmlns:a16="http://schemas.microsoft.com/office/drawing/2014/main" id="{955242FB-1453-5E4A-B9AC-9E4ACD40FBE2}"/>
+              </a:ext>
+            </a:extLst>
+          </p:cNvPr>
+          <p:cNvSpPr txBox="1"/>
+          <p:nvPr/>
+        </p:nvSpPr>
+        <p:spPr>
+          <a:xfrm>
+            <a:off x="10975596" y="1118802"/>
+            <a:ext cx="1073791" cy="307777"/>
+          </a:xfrm>
+          <a:prstGeom prst="rect">
+            <a:avLst/>
+          </a:prstGeom>
+          <a:noFill/>
+        </p:spPr>
+        <p:txBody>
+          <a:bodyPr wrap="square" rtlCol="0">
+            <a:spAutoFit/>
+          </a:bodyPr>
+          <a:lstStyle/>
+          <a:p>
+            <a:r>
+              <a:rPr lang="en-US" sz="1400" dirty="0"/>
+              <a:t>Sign out</a:t>
+            </a:r>
+          </a:p>
+        </p:txBody>
+      </p:sp>
+      <p:sp>
+        <p:nvSpPr>
+          <p:cNvPr id="13" name="TextBox 12">
+            <a:extLst>
+              <a:ext uri="{FF2B5EF4-FFF2-40B4-BE49-F238E27FC236}">
+                <a16:creationId xmlns:a16="http://schemas.microsoft.com/office/drawing/2014/main" id="{6D3B998B-4F2D-1944-A306-E02E48B4D9C8}"/>
+              </a:ext>
+            </a:extLst>
+          </p:cNvPr>
+          <p:cNvSpPr txBox="1"/>
+          <p:nvPr/>
+        </p:nvSpPr>
+        <p:spPr>
+          <a:xfrm>
+            <a:off x="679508" y="1007059"/>
+            <a:ext cx="1266738" cy="369332"/>
+          </a:xfrm>
+          <a:prstGeom prst="rect">
+            <a:avLst/>
+          </a:prstGeom>
+          <a:noFill/>
+        </p:spPr>
+        <p:txBody>
+          <a:bodyPr wrap="square" rtlCol="0">
+            <a:spAutoFit/>
+          </a:bodyPr>
+          <a:lstStyle/>
+          <a:p>
+            <a:r>
+              <a:rPr lang="en-US" dirty="0"/>
+              <a:t>Home</a:t>
+            </a:r>
+          </a:p>
+        </p:txBody>
+      </p:sp>
+      <p:sp>
+        <p:nvSpPr>
+          <p:cNvPr id="14" name="TextBox 13">
+            <a:extLst>
+              <a:ext uri="{FF2B5EF4-FFF2-40B4-BE49-F238E27FC236}">
+                <a16:creationId xmlns:a16="http://schemas.microsoft.com/office/drawing/2014/main" id="{7234AEA2-AEC3-0844-BDC9-78282380EB27}"/>
+              </a:ext>
+            </a:extLst>
+          </p:cNvPr>
+          <p:cNvSpPr txBox="1"/>
+          <p:nvPr/>
+        </p:nvSpPr>
+        <p:spPr>
+          <a:xfrm>
+            <a:off x="1149292" y="5403711"/>
+            <a:ext cx="1266738" cy="646331"/>
+          </a:xfrm>
+          <a:prstGeom prst="rect">
+            <a:avLst/>
+          </a:prstGeom>
+          <a:noFill/>
+        </p:spPr>
+        <p:txBody>
+          <a:bodyPr wrap="square" rtlCol="0">
+            <a:spAutoFit/>
+          </a:bodyPr>
+          <a:lstStyle/>
+          <a:p>
+            <a:r>
+              <a:rPr lang="en-US" dirty="0"/>
+              <a:t>Contact Details</a:t>
+            </a:r>
+          </a:p>
+        </p:txBody>
+      </p:sp>
+      <p:sp>
+        <p:nvSpPr>
+          <p:cNvPr id="15" name="TextBox 14">
+            <a:extLst>
+              <a:ext uri="{FF2B5EF4-FFF2-40B4-BE49-F238E27FC236}">
+                <a16:creationId xmlns:a16="http://schemas.microsoft.com/office/drawing/2014/main" id="{BBB57AFB-704D-B24F-8BE1-DE3DB4972EF5}"/>
+              </a:ext>
+            </a:extLst>
+          </p:cNvPr>
+          <p:cNvSpPr txBox="1"/>
+          <p:nvPr/>
+        </p:nvSpPr>
+        <p:spPr>
+          <a:xfrm>
+            <a:off x="4769140" y="356344"/>
+            <a:ext cx="2189527" cy="646331"/>
+          </a:xfrm>
+          <a:prstGeom prst="rect">
+            <a:avLst/>
+          </a:prstGeom>
+          <a:noFill/>
+        </p:spPr>
+        <p:txBody>
+          <a:bodyPr wrap="square" rtlCol="0">
+            <a:spAutoFit/>
+          </a:bodyPr>
+          <a:lstStyle/>
+          <a:p>
+            <a:r>
+              <a:rPr lang="en-US" dirty="0"/>
+              <a:t>Doctor Access</a:t>
+            </a:r>
+          </a:p>
+          <a:p>
+            <a:r>
+              <a:rPr lang="en-US" dirty="0"/>
+              <a:t>(Hospital Name)</a:t>
+            </a:r>
+          </a:p>
+        </p:txBody>
+      </p:sp>
+      <p:sp>
+        <p:nvSpPr>
+          <p:cNvPr id="17" name="TextBox 16">
+            <a:extLst>
+              <a:ext uri="{FF2B5EF4-FFF2-40B4-BE49-F238E27FC236}">
+                <a16:creationId xmlns:a16="http://schemas.microsoft.com/office/drawing/2014/main" id="{050A665A-C98A-B44A-8A44-D61414C70B12}"/>
+              </a:ext>
+            </a:extLst>
+          </p:cNvPr>
+          <p:cNvSpPr txBox="1"/>
+          <p:nvPr/>
+        </p:nvSpPr>
+        <p:spPr>
+          <a:xfrm>
+            <a:off x="10389765" y="5462434"/>
+            <a:ext cx="1266738" cy="369332"/>
+          </a:xfrm>
+          <a:prstGeom prst="rect">
+            <a:avLst/>
+          </a:prstGeom>
+          <a:noFill/>
+        </p:spPr>
+        <p:txBody>
+          <a:bodyPr wrap="square" rtlCol="0">
+            <a:spAutoFit/>
+          </a:bodyPr>
+          <a:lstStyle/>
+          <a:p>
+            <a:r>
+              <a:rPr lang="en-US" dirty="0"/>
+              <a:t>Copyright</a:t>
+            </a:r>
+          </a:p>
+        </p:txBody>
+      </p:sp>
+      <p:sp>
+        <p:nvSpPr>
+          <p:cNvPr id="19" name="TextBox 18">
+            <a:extLst>
+              <a:ext uri="{FF2B5EF4-FFF2-40B4-BE49-F238E27FC236}">
+                <a16:creationId xmlns:a16="http://schemas.microsoft.com/office/drawing/2014/main" id="{70561B6D-D157-8A49-ABED-A54D0725474B}"/>
+              </a:ext>
+            </a:extLst>
+          </p:cNvPr>
+          <p:cNvSpPr txBox="1"/>
+          <p:nvPr/>
+        </p:nvSpPr>
+        <p:spPr>
+          <a:xfrm>
+            <a:off x="9708857" y="1109391"/>
+            <a:ext cx="1266739" cy="338554"/>
+          </a:xfrm>
+          <a:prstGeom prst="rect">
+            <a:avLst/>
+          </a:prstGeom>
+          <a:noFill/>
+        </p:spPr>
+        <p:txBody>
+          <a:bodyPr wrap="square" rtlCol="0">
+            <a:spAutoFit/>
+          </a:bodyPr>
+          <a:lstStyle/>
+          <a:p>
+            <a:r>
+              <a:rPr lang="en-US" sz="1600" dirty="0"/>
+              <a:t>Messages</a:t>
+            </a:r>
+          </a:p>
+        </p:txBody>
+      </p:sp>
+      <p:sp>
+        <p:nvSpPr>
           <p:cNvPr id="21" name="TextBox 20">
             <a:extLst>
               <a:ext uri="{FF2B5EF4-FFF2-40B4-BE49-F238E27FC236}">
@@ -6051,7 +6306,7 @@
 </p:sld>
 </file>
 
-<file path=ppt/slides/slide13.xml><?xml version="1.0" encoding="utf-8"?>
+<file path=ppt/slides/slide14.xml><?xml version="1.0" encoding="utf-8"?>
 <p:sld xmlns:a="http://schemas.openxmlformats.org/drawingml/2006/main" xmlns:r="http://schemas.openxmlformats.org/officeDocument/2006/relationships" xmlns:p="http://schemas.openxmlformats.org/presentationml/2006/main">
   <p:cSld>
     <p:spTree>

</xml_diff>